<commit_message>
First commit of my project
</commit_message>
<xml_diff>
--- a/Project Design/Дизайн приложения.pptx
+++ b/Project Design/Дизайн приложения.pptx
@@ -10,6 +10,7 @@
     <p:sldId id="256" r:id="rId4"/>
     <p:sldId id="260" r:id="rId5"/>
     <p:sldId id="257" r:id="rId6"/>
+    <p:sldId id="261" r:id="rId7"/>
   </p:sldIdLst>
   <p:sldSz cx="12192000" cy="6858000"/>
   <p:notesSz cx="6858000" cy="9144000"/>
@@ -277,7 +278,7 @@
           <a:p>
             <a:fld id="{A5FBC0E8-71AA-4F72-A793-5269936D4CDD}" type="datetimeFigureOut">
               <a:rPr lang="uk-UA" smtClean="0"/>
-              <a:t>27.03.2023</a:t>
+              <a:t>09.04.2023</a:t>
             </a:fld>
             <a:endParaRPr lang="uk-UA"/>
           </a:p>
@@ -477,7 +478,7 @@
           <a:p>
             <a:fld id="{A5FBC0E8-71AA-4F72-A793-5269936D4CDD}" type="datetimeFigureOut">
               <a:rPr lang="uk-UA" smtClean="0"/>
-              <a:t>27.03.2023</a:t>
+              <a:t>09.04.2023</a:t>
             </a:fld>
             <a:endParaRPr lang="uk-UA"/>
           </a:p>
@@ -687,7 +688,7 @@
           <a:p>
             <a:fld id="{A5FBC0E8-71AA-4F72-A793-5269936D4CDD}" type="datetimeFigureOut">
               <a:rPr lang="uk-UA" smtClean="0"/>
-              <a:t>27.03.2023</a:t>
+              <a:t>09.04.2023</a:t>
             </a:fld>
             <a:endParaRPr lang="uk-UA"/>
           </a:p>
@@ -887,7 +888,7 @@
           <a:p>
             <a:fld id="{A5FBC0E8-71AA-4F72-A793-5269936D4CDD}" type="datetimeFigureOut">
               <a:rPr lang="uk-UA" smtClean="0"/>
-              <a:t>27.03.2023</a:t>
+              <a:t>09.04.2023</a:t>
             </a:fld>
             <a:endParaRPr lang="uk-UA"/>
           </a:p>
@@ -1163,7 +1164,7 @@
           <a:p>
             <a:fld id="{A5FBC0E8-71AA-4F72-A793-5269936D4CDD}" type="datetimeFigureOut">
               <a:rPr lang="uk-UA" smtClean="0"/>
-              <a:t>27.03.2023</a:t>
+              <a:t>09.04.2023</a:t>
             </a:fld>
             <a:endParaRPr lang="uk-UA"/>
           </a:p>
@@ -1431,7 +1432,7 @@
           <a:p>
             <a:fld id="{A5FBC0E8-71AA-4F72-A793-5269936D4CDD}" type="datetimeFigureOut">
               <a:rPr lang="uk-UA" smtClean="0"/>
-              <a:t>27.03.2023</a:t>
+              <a:t>09.04.2023</a:t>
             </a:fld>
             <a:endParaRPr lang="uk-UA"/>
           </a:p>
@@ -1846,7 +1847,7 @@
           <a:p>
             <a:fld id="{A5FBC0E8-71AA-4F72-A793-5269936D4CDD}" type="datetimeFigureOut">
               <a:rPr lang="uk-UA" smtClean="0"/>
-              <a:t>27.03.2023</a:t>
+              <a:t>09.04.2023</a:t>
             </a:fld>
             <a:endParaRPr lang="uk-UA"/>
           </a:p>
@@ -1988,7 +1989,7 @@
           <a:p>
             <a:fld id="{A5FBC0E8-71AA-4F72-A793-5269936D4CDD}" type="datetimeFigureOut">
               <a:rPr lang="uk-UA" smtClean="0"/>
-              <a:t>27.03.2023</a:t>
+              <a:t>09.04.2023</a:t>
             </a:fld>
             <a:endParaRPr lang="uk-UA"/>
           </a:p>
@@ -2101,7 +2102,7 @@
           <a:p>
             <a:fld id="{A5FBC0E8-71AA-4F72-A793-5269936D4CDD}" type="datetimeFigureOut">
               <a:rPr lang="uk-UA" smtClean="0"/>
-              <a:t>27.03.2023</a:t>
+              <a:t>09.04.2023</a:t>
             </a:fld>
             <a:endParaRPr lang="uk-UA"/>
           </a:p>
@@ -2414,7 +2415,7 @@
           <a:p>
             <a:fld id="{A5FBC0E8-71AA-4F72-A793-5269936D4CDD}" type="datetimeFigureOut">
               <a:rPr lang="uk-UA" smtClean="0"/>
-              <a:t>27.03.2023</a:t>
+              <a:t>09.04.2023</a:t>
             </a:fld>
             <a:endParaRPr lang="uk-UA"/>
           </a:p>
@@ -2703,7 +2704,7 @@
           <a:p>
             <a:fld id="{A5FBC0E8-71AA-4F72-A793-5269936D4CDD}" type="datetimeFigureOut">
               <a:rPr lang="uk-UA" smtClean="0"/>
-              <a:t>27.03.2023</a:t>
+              <a:t>09.04.2023</a:t>
             </a:fld>
             <a:endParaRPr lang="uk-UA"/>
           </a:p>
@@ -2946,7 +2947,7 @@
           <a:p>
             <a:fld id="{A5FBC0E8-71AA-4F72-A793-5269936D4CDD}" type="datetimeFigureOut">
               <a:rPr lang="uk-UA" smtClean="0"/>
-              <a:t>27.03.2023</a:t>
+              <a:t>09.04.2023</a:t>
             </a:fld>
             <a:endParaRPr lang="uk-UA"/>
           </a:p>
@@ -4176,7 +4177,7 @@
         </p:nvSpPr>
         <p:spPr>
           <a:xfrm>
-            <a:off x="750780" y="1454625"/>
+            <a:off x="750780" y="1472978"/>
             <a:ext cx="1084729" cy="320386"/>
           </a:xfrm>
           <a:prstGeom prst="rect">
@@ -4319,7 +4320,7 @@
         </p:nvSpPr>
         <p:spPr>
           <a:xfrm>
-            <a:off x="1976688" y="1454625"/>
+            <a:off x="1976688" y="1472978"/>
             <a:ext cx="1084729" cy="320386"/>
           </a:xfrm>
           <a:prstGeom prst="rect">
@@ -4386,7 +4387,7 @@
         </p:nvSpPr>
         <p:spPr>
           <a:xfrm>
-            <a:off x="3202596" y="1454625"/>
+            <a:off x="3202596" y="1472978"/>
             <a:ext cx="1084729" cy="320386"/>
           </a:xfrm>
           <a:prstGeom prst="rect">
@@ -4453,7 +4454,7 @@
         </p:nvSpPr>
         <p:spPr>
           <a:xfrm>
-            <a:off x="4428504" y="1454625"/>
+            <a:off x="4428504" y="1472978"/>
             <a:ext cx="1084729" cy="320386"/>
           </a:xfrm>
           <a:prstGeom prst="rect">
@@ -4520,7 +4521,7 @@
         </p:nvSpPr>
         <p:spPr>
           <a:xfrm>
-            <a:off x="5654412" y="1454625"/>
+            <a:off x="5654412" y="1472978"/>
             <a:ext cx="1084729" cy="320386"/>
           </a:xfrm>
           <a:prstGeom prst="rect">
@@ -4587,7 +4588,7 @@
         </p:nvSpPr>
         <p:spPr>
           <a:xfrm>
-            <a:off x="6880320" y="1456663"/>
+            <a:off x="6880320" y="1475016"/>
             <a:ext cx="1084729" cy="320386"/>
           </a:xfrm>
           <a:prstGeom prst="rect">
@@ -4654,7 +4655,7 @@
         </p:nvSpPr>
         <p:spPr>
           <a:xfrm>
-            <a:off x="8106228" y="1454625"/>
+            <a:off x="8106228" y="1472978"/>
             <a:ext cx="1084729" cy="320386"/>
           </a:xfrm>
           <a:prstGeom prst="rect">
@@ -23974,6 +23975,1836 @@
 </p:sld>
 </file>
 
+<file path=ppt/slides/slide6.xml><?xml version="1.0" encoding="utf-8"?>
+<p:sld xmlns:a="http://schemas.openxmlformats.org/drawingml/2006/main" xmlns:r="http://schemas.openxmlformats.org/officeDocument/2006/relationships" xmlns:p="http://schemas.openxmlformats.org/presentationml/2006/main">
+  <p:cSld>
+    <p:spTree>
+      <p:nvGrpSpPr>
+        <p:cNvPr id="1" name=""/>
+        <p:cNvGrpSpPr/>
+        <p:nvPr/>
+      </p:nvGrpSpPr>
+      <p:grpSpPr>
+        <a:xfrm>
+          <a:off x="0" y="0"/>
+          <a:ext cx="0" cy="0"/>
+          <a:chOff x="0" y="0"/>
+          <a:chExt cx="0" cy="0"/>
+        </a:xfrm>
+      </p:grpSpPr>
+      <p:sp>
+        <p:nvSpPr>
+          <p:cNvPr id="4" name="Прямоугольник 3">
+            <a:extLst>
+              <a:ext uri="{FF2B5EF4-FFF2-40B4-BE49-F238E27FC236}">
+                <a16:creationId xmlns:a16="http://schemas.microsoft.com/office/drawing/2014/main" id="{6F295A0A-90B7-477C-94B0-E9C02C8F4D7C}"/>
+              </a:ext>
+            </a:extLst>
+          </p:cNvPr>
+          <p:cNvSpPr/>
+          <p:nvPr/>
+        </p:nvSpPr>
+        <p:spPr>
+          <a:xfrm>
+            <a:off x="941294" y="197224"/>
+            <a:ext cx="10712824" cy="986118"/>
+          </a:xfrm>
+          <a:prstGeom prst="rect">
+            <a:avLst/>
+          </a:prstGeom>
+        </p:spPr>
+        <p:style>
+          <a:lnRef idx="2">
+            <a:schemeClr val="accent1">
+              <a:shade val="50000"/>
+            </a:schemeClr>
+          </a:lnRef>
+          <a:fillRef idx="1">
+            <a:schemeClr val="accent1"/>
+          </a:fillRef>
+          <a:effectRef idx="0">
+            <a:schemeClr val="accent1"/>
+          </a:effectRef>
+          <a:fontRef idx="minor">
+            <a:schemeClr val="lt1"/>
+          </a:fontRef>
+        </p:style>
+        <p:txBody>
+          <a:bodyPr rtlCol="0" anchor="t"/>
+          <a:lstStyle/>
+          <a:p>
+            <a:pPr algn="ctr"/>
+            <a:r>
+              <a:rPr lang="ru-RU" dirty="0"/>
+              <a:t>База данных юзеров (менеджеры)</a:t>
+            </a:r>
+            <a:endParaRPr lang="uk-UA" dirty="0"/>
+          </a:p>
+        </p:txBody>
+      </p:sp>
+      <p:sp>
+        <p:nvSpPr>
+          <p:cNvPr id="5" name="Прямоугольник 4">
+            <a:extLst>
+              <a:ext uri="{FF2B5EF4-FFF2-40B4-BE49-F238E27FC236}">
+                <a16:creationId xmlns:a16="http://schemas.microsoft.com/office/drawing/2014/main" id="{85B48B06-657E-45C0-A6AC-109656918CBE}"/>
+              </a:ext>
+            </a:extLst>
+          </p:cNvPr>
+          <p:cNvSpPr/>
+          <p:nvPr/>
+        </p:nvSpPr>
+        <p:spPr>
+          <a:xfrm>
+            <a:off x="941294" y="1443317"/>
+            <a:ext cx="10721787" cy="824754"/>
+          </a:xfrm>
+          <a:prstGeom prst="rect">
+            <a:avLst/>
+          </a:prstGeom>
+        </p:spPr>
+        <p:style>
+          <a:lnRef idx="2">
+            <a:schemeClr val="accent1">
+              <a:shade val="50000"/>
+            </a:schemeClr>
+          </a:lnRef>
+          <a:fillRef idx="1">
+            <a:schemeClr val="accent1"/>
+          </a:fillRef>
+          <a:effectRef idx="0">
+            <a:schemeClr val="accent1"/>
+          </a:effectRef>
+          <a:fontRef idx="minor">
+            <a:schemeClr val="lt1"/>
+          </a:fontRef>
+        </p:style>
+        <p:txBody>
+          <a:bodyPr rtlCol="0" anchor="t"/>
+          <a:lstStyle/>
+          <a:p>
+            <a:pPr algn="ctr"/>
+            <a:r>
+              <a:rPr lang="ru-RU" dirty="0"/>
+              <a:t>База данных </a:t>
+            </a:r>
+            <a:r>
+              <a:rPr lang="ru-RU" dirty="0" err="1"/>
+              <a:t>лидов</a:t>
+            </a:r>
+            <a:r>
+              <a:rPr lang="ru-RU" dirty="0"/>
+              <a:t> (</a:t>
+            </a:r>
+            <a:r>
+              <a:rPr lang="ru-RU" dirty="0" err="1"/>
+              <a:t>лпры</a:t>
+            </a:r>
+            <a:r>
+              <a:rPr lang="ru-RU" dirty="0"/>
+              <a:t>, контакты)</a:t>
+            </a:r>
+          </a:p>
+        </p:txBody>
+      </p:sp>
+      <p:sp>
+        <p:nvSpPr>
+          <p:cNvPr id="9" name="Прямоугольник 8">
+            <a:extLst>
+              <a:ext uri="{FF2B5EF4-FFF2-40B4-BE49-F238E27FC236}">
+                <a16:creationId xmlns:a16="http://schemas.microsoft.com/office/drawing/2014/main" id="{9BA6A937-E323-4FEC-9F19-D8FA88EAA6A9}"/>
+              </a:ext>
+            </a:extLst>
+          </p:cNvPr>
+          <p:cNvSpPr/>
+          <p:nvPr/>
+        </p:nvSpPr>
+        <p:spPr>
+          <a:xfrm>
+            <a:off x="1118333" y="1840537"/>
+            <a:ext cx="1084729" cy="320386"/>
+          </a:xfrm>
+          <a:prstGeom prst="rect">
+            <a:avLst/>
+          </a:prstGeom>
+          <a:solidFill>
+            <a:schemeClr val="accent6">
+              <a:lumMod val="40000"/>
+              <a:lumOff val="60000"/>
+            </a:schemeClr>
+          </a:solidFill>
+        </p:spPr>
+        <p:style>
+          <a:lnRef idx="2">
+            <a:schemeClr val="accent1">
+              <a:shade val="50000"/>
+            </a:schemeClr>
+          </a:lnRef>
+          <a:fillRef idx="1">
+            <a:schemeClr val="accent1"/>
+          </a:fillRef>
+          <a:effectRef idx="0">
+            <a:schemeClr val="accent1"/>
+          </a:effectRef>
+          <a:fontRef idx="minor">
+            <a:schemeClr val="lt1"/>
+          </a:fontRef>
+        </p:style>
+        <p:txBody>
+          <a:bodyPr rtlCol="0" anchor="ctr"/>
+          <a:lstStyle/>
+          <a:p>
+            <a:pPr algn="ctr"/>
+            <a:r>
+              <a:rPr lang="ru-RU" sz="1050" dirty="0">
+                <a:ln w="0"/>
+                <a:solidFill>
+                  <a:schemeClr val="tx1"/>
+                </a:solidFill>
+                <a:effectLst>
+                  <a:outerShdw blurRad="38100" dist="19050" dir="2700000" algn="tl" rotWithShape="0">
+                    <a:schemeClr val="dk1">
+                      <a:alpha val="40000"/>
+                    </a:schemeClr>
+                  </a:outerShdw>
+                </a:effectLst>
+              </a:rPr>
+              <a:t>ФИО</a:t>
+            </a:r>
+            <a:endParaRPr lang="uk-UA" sz="1050" dirty="0"/>
+          </a:p>
+        </p:txBody>
+      </p:sp>
+      <p:sp>
+        <p:nvSpPr>
+          <p:cNvPr id="10" name="Прямоугольник 9">
+            <a:extLst>
+              <a:ext uri="{FF2B5EF4-FFF2-40B4-BE49-F238E27FC236}">
+                <a16:creationId xmlns:a16="http://schemas.microsoft.com/office/drawing/2014/main" id="{1765875D-D4FC-43CC-BB1A-2F820AAA36F7}"/>
+              </a:ext>
+            </a:extLst>
+          </p:cNvPr>
+          <p:cNvSpPr/>
+          <p:nvPr/>
+        </p:nvSpPr>
+        <p:spPr>
+          <a:xfrm>
+            <a:off x="2344241" y="1840537"/>
+            <a:ext cx="1084729" cy="320386"/>
+          </a:xfrm>
+          <a:prstGeom prst="rect">
+            <a:avLst/>
+          </a:prstGeom>
+          <a:solidFill>
+            <a:schemeClr val="accent6">
+              <a:lumMod val="40000"/>
+              <a:lumOff val="60000"/>
+            </a:schemeClr>
+          </a:solidFill>
+        </p:spPr>
+        <p:style>
+          <a:lnRef idx="2">
+            <a:schemeClr val="accent1">
+              <a:shade val="50000"/>
+            </a:schemeClr>
+          </a:lnRef>
+          <a:fillRef idx="1">
+            <a:schemeClr val="accent1"/>
+          </a:fillRef>
+          <a:effectRef idx="0">
+            <a:schemeClr val="accent1"/>
+          </a:effectRef>
+          <a:fontRef idx="minor">
+            <a:schemeClr val="lt1"/>
+          </a:fontRef>
+        </p:style>
+        <p:txBody>
+          <a:bodyPr rtlCol="0" anchor="ctr"/>
+          <a:lstStyle/>
+          <a:p>
+            <a:pPr algn="ctr"/>
+            <a:r>
+              <a:rPr lang="ru-RU" sz="1050" dirty="0">
+                <a:ln w="0"/>
+                <a:solidFill>
+                  <a:schemeClr val="tx1"/>
+                </a:solidFill>
+                <a:effectLst>
+                  <a:outerShdw blurRad="38100" dist="19050" dir="2700000" algn="tl" rotWithShape="0">
+                    <a:schemeClr val="dk1">
+                      <a:alpha val="40000"/>
+                    </a:schemeClr>
+                  </a:outerShdw>
+                </a:effectLst>
+              </a:rPr>
+              <a:t>телефон</a:t>
+            </a:r>
+            <a:endParaRPr lang="uk-UA" sz="1050" dirty="0"/>
+          </a:p>
+        </p:txBody>
+      </p:sp>
+      <p:sp>
+        <p:nvSpPr>
+          <p:cNvPr id="11" name="Прямоугольник 10">
+            <a:extLst>
+              <a:ext uri="{FF2B5EF4-FFF2-40B4-BE49-F238E27FC236}">
+                <a16:creationId xmlns:a16="http://schemas.microsoft.com/office/drawing/2014/main" id="{467BAD26-6A22-46A6-B845-05DF704B605C}"/>
+              </a:ext>
+            </a:extLst>
+          </p:cNvPr>
+          <p:cNvSpPr/>
+          <p:nvPr/>
+        </p:nvSpPr>
+        <p:spPr>
+          <a:xfrm>
+            <a:off x="3570149" y="1840537"/>
+            <a:ext cx="1084729" cy="320386"/>
+          </a:xfrm>
+          <a:prstGeom prst="rect">
+            <a:avLst/>
+          </a:prstGeom>
+          <a:solidFill>
+            <a:schemeClr val="accent6">
+              <a:lumMod val="40000"/>
+              <a:lumOff val="60000"/>
+            </a:schemeClr>
+          </a:solidFill>
+        </p:spPr>
+        <p:style>
+          <a:lnRef idx="2">
+            <a:schemeClr val="accent1">
+              <a:shade val="50000"/>
+            </a:schemeClr>
+          </a:lnRef>
+          <a:fillRef idx="1">
+            <a:schemeClr val="accent1"/>
+          </a:fillRef>
+          <a:effectRef idx="0">
+            <a:schemeClr val="accent1"/>
+          </a:effectRef>
+          <a:fontRef idx="minor">
+            <a:schemeClr val="lt1"/>
+          </a:fontRef>
+        </p:style>
+        <p:txBody>
+          <a:bodyPr rtlCol="0" anchor="ctr"/>
+          <a:lstStyle/>
+          <a:p>
+            <a:pPr algn="ctr"/>
+            <a:r>
+              <a:rPr lang="ru-RU" sz="1050" dirty="0">
+                <a:ln w="0"/>
+                <a:solidFill>
+                  <a:schemeClr val="tx1"/>
+                </a:solidFill>
+                <a:effectLst>
+                  <a:outerShdw blurRad="38100" dist="19050" dir="2700000" algn="tl" rotWithShape="0">
+                    <a:schemeClr val="dk1">
+                      <a:alpha val="40000"/>
+                    </a:schemeClr>
+                  </a:outerShdw>
+                </a:effectLst>
+              </a:rPr>
+              <a:t>почта</a:t>
+            </a:r>
+            <a:endParaRPr lang="uk-UA" sz="1050" dirty="0"/>
+          </a:p>
+        </p:txBody>
+      </p:sp>
+      <p:sp>
+        <p:nvSpPr>
+          <p:cNvPr id="12" name="Прямоугольник 11">
+            <a:extLst>
+              <a:ext uri="{FF2B5EF4-FFF2-40B4-BE49-F238E27FC236}">
+                <a16:creationId xmlns:a16="http://schemas.microsoft.com/office/drawing/2014/main" id="{F03F05EA-BDCB-4991-9DBF-6DEC8D3578AC}"/>
+              </a:ext>
+            </a:extLst>
+          </p:cNvPr>
+          <p:cNvSpPr/>
+          <p:nvPr/>
+        </p:nvSpPr>
+        <p:spPr>
+          <a:xfrm>
+            <a:off x="6002968" y="1855694"/>
+            <a:ext cx="1084729" cy="320386"/>
+          </a:xfrm>
+          <a:prstGeom prst="rect">
+            <a:avLst/>
+          </a:prstGeom>
+          <a:solidFill>
+            <a:schemeClr val="bg1">
+              <a:lumMod val="95000"/>
+            </a:schemeClr>
+          </a:solidFill>
+        </p:spPr>
+        <p:style>
+          <a:lnRef idx="2">
+            <a:schemeClr val="accent1">
+              <a:shade val="50000"/>
+            </a:schemeClr>
+          </a:lnRef>
+          <a:fillRef idx="1">
+            <a:schemeClr val="accent1"/>
+          </a:fillRef>
+          <a:effectRef idx="0">
+            <a:schemeClr val="accent1"/>
+          </a:effectRef>
+          <a:fontRef idx="minor">
+            <a:schemeClr val="lt1"/>
+          </a:fontRef>
+        </p:style>
+        <p:txBody>
+          <a:bodyPr rtlCol="0" anchor="ctr"/>
+          <a:lstStyle/>
+          <a:p>
+            <a:pPr algn="ctr"/>
+            <a:r>
+              <a:rPr lang="ru-RU" sz="1050" dirty="0">
+                <a:ln w="0"/>
+                <a:solidFill>
+                  <a:schemeClr val="tx1"/>
+                </a:solidFill>
+                <a:effectLst>
+                  <a:outerShdw blurRad="38100" dist="19050" dir="2700000" algn="tl" rotWithShape="0">
+                    <a:schemeClr val="dk1">
+                      <a:alpha val="40000"/>
+                    </a:schemeClr>
+                  </a:outerShdw>
+                </a:effectLst>
+              </a:rPr>
+              <a:t>компания</a:t>
+            </a:r>
+            <a:endParaRPr lang="uk-UA" sz="1050" dirty="0"/>
+          </a:p>
+        </p:txBody>
+      </p:sp>
+      <p:sp>
+        <p:nvSpPr>
+          <p:cNvPr id="13" name="Прямоугольник 12">
+            <a:extLst>
+              <a:ext uri="{FF2B5EF4-FFF2-40B4-BE49-F238E27FC236}">
+                <a16:creationId xmlns:a16="http://schemas.microsoft.com/office/drawing/2014/main" id="{BA6E9218-2C46-4BB0-9693-EA5C19A867FE}"/>
+              </a:ext>
+            </a:extLst>
+          </p:cNvPr>
+          <p:cNvSpPr/>
+          <p:nvPr/>
+        </p:nvSpPr>
+        <p:spPr>
+          <a:xfrm>
+            <a:off x="7209879" y="1855694"/>
+            <a:ext cx="1084729" cy="320386"/>
+          </a:xfrm>
+          <a:prstGeom prst="rect">
+            <a:avLst/>
+          </a:prstGeom>
+          <a:solidFill>
+            <a:schemeClr val="bg1">
+              <a:lumMod val="95000"/>
+            </a:schemeClr>
+          </a:solidFill>
+        </p:spPr>
+        <p:style>
+          <a:lnRef idx="2">
+            <a:schemeClr val="accent1">
+              <a:shade val="50000"/>
+            </a:schemeClr>
+          </a:lnRef>
+          <a:fillRef idx="1">
+            <a:schemeClr val="accent1"/>
+          </a:fillRef>
+          <a:effectRef idx="0">
+            <a:schemeClr val="accent1"/>
+          </a:effectRef>
+          <a:fontRef idx="minor">
+            <a:schemeClr val="lt1"/>
+          </a:fontRef>
+        </p:style>
+        <p:txBody>
+          <a:bodyPr rtlCol="0" anchor="ctr"/>
+          <a:lstStyle/>
+          <a:p>
+            <a:pPr algn="ctr"/>
+            <a:r>
+              <a:rPr lang="ru-RU" sz="1050" dirty="0">
+                <a:ln w="0"/>
+                <a:solidFill>
+                  <a:schemeClr val="tx1"/>
+                </a:solidFill>
+                <a:effectLst>
+                  <a:outerShdw blurRad="38100" dist="19050" dir="2700000" algn="tl" rotWithShape="0">
+                    <a:schemeClr val="dk1">
+                      <a:alpha val="40000"/>
+                    </a:schemeClr>
+                  </a:outerShdw>
+                </a:effectLst>
+              </a:rPr>
+              <a:t>должность</a:t>
+            </a:r>
+            <a:endParaRPr lang="uk-UA" sz="1050" dirty="0"/>
+          </a:p>
+        </p:txBody>
+      </p:sp>
+      <p:sp>
+        <p:nvSpPr>
+          <p:cNvPr id="16" name="Прямоугольник 15">
+            <a:extLst>
+              <a:ext uri="{FF2B5EF4-FFF2-40B4-BE49-F238E27FC236}">
+                <a16:creationId xmlns:a16="http://schemas.microsoft.com/office/drawing/2014/main" id="{A6AEDBAA-667C-44BA-91BF-57FEAFE22131}"/>
+              </a:ext>
+            </a:extLst>
+          </p:cNvPr>
+          <p:cNvSpPr/>
+          <p:nvPr/>
+        </p:nvSpPr>
+        <p:spPr>
+          <a:xfrm>
+            <a:off x="8435787" y="1855694"/>
+            <a:ext cx="2931459" cy="320386"/>
+          </a:xfrm>
+          <a:prstGeom prst="rect">
+            <a:avLst/>
+          </a:prstGeom>
+          <a:solidFill>
+            <a:schemeClr val="bg1">
+              <a:lumMod val="95000"/>
+            </a:schemeClr>
+          </a:solidFill>
+        </p:spPr>
+        <p:style>
+          <a:lnRef idx="2">
+            <a:schemeClr val="accent1">
+              <a:shade val="50000"/>
+            </a:schemeClr>
+          </a:lnRef>
+          <a:fillRef idx="1">
+            <a:schemeClr val="accent1"/>
+          </a:fillRef>
+          <a:effectRef idx="0">
+            <a:schemeClr val="accent1"/>
+          </a:effectRef>
+          <a:fontRef idx="minor">
+            <a:schemeClr val="lt1"/>
+          </a:fontRef>
+        </p:style>
+        <p:txBody>
+          <a:bodyPr rtlCol="0" anchor="ctr"/>
+          <a:lstStyle/>
+          <a:p>
+            <a:pPr algn="ctr"/>
+            <a:r>
+              <a:rPr lang="ru-RU" sz="1050" dirty="0">
+                <a:ln w="0"/>
+                <a:solidFill>
+                  <a:schemeClr val="tx1"/>
+                </a:solidFill>
+                <a:effectLst>
+                  <a:outerShdw blurRad="38100" dist="19050" dir="2700000" algn="tl" rotWithShape="0">
+                    <a:schemeClr val="dk1">
+                      <a:alpha val="40000"/>
+                    </a:schemeClr>
+                  </a:outerShdw>
+                </a:effectLst>
+              </a:rPr>
+              <a:t>Описание личности</a:t>
+            </a:r>
+            <a:endParaRPr lang="uk-UA" sz="1050" dirty="0"/>
+          </a:p>
+        </p:txBody>
+      </p:sp>
+      <p:sp>
+        <p:nvSpPr>
+          <p:cNvPr id="17" name="Прямоугольник 16">
+            <a:extLst>
+              <a:ext uri="{FF2B5EF4-FFF2-40B4-BE49-F238E27FC236}">
+                <a16:creationId xmlns:a16="http://schemas.microsoft.com/office/drawing/2014/main" id="{BD4C7DB7-6FCC-47AD-AA9E-D9EDCBB827AB}"/>
+              </a:ext>
+            </a:extLst>
+          </p:cNvPr>
+          <p:cNvSpPr/>
+          <p:nvPr/>
+        </p:nvSpPr>
+        <p:spPr>
+          <a:xfrm>
+            <a:off x="1118333" y="735218"/>
+            <a:ext cx="1084729" cy="320386"/>
+          </a:xfrm>
+          <a:prstGeom prst="rect">
+            <a:avLst/>
+          </a:prstGeom>
+          <a:solidFill>
+            <a:schemeClr val="accent6">
+              <a:lumMod val="40000"/>
+              <a:lumOff val="60000"/>
+            </a:schemeClr>
+          </a:solidFill>
+        </p:spPr>
+        <p:style>
+          <a:lnRef idx="2">
+            <a:schemeClr val="accent1">
+              <a:shade val="50000"/>
+            </a:schemeClr>
+          </a:lnRef>
+          <a:fillRef idx="1">
+            <a:schemeClr val="accent1"/>
+          </a:fillRef>
+          <a:effectRef idx="0">
+            <a:schemeClr val="accent1"/>
+          </a:effectRef>
+          <a:fontRef idx="minor">
+            <a:schemeClr val="lt1"/>
+          </a:fontRef>
+        </p:style>
+        <p:txBody>
+          <a:bodyPr rtlCol="0" anchor="ctr"/>
+          <a:lstStyle/>
+          <a:p>
+            <a:pPr algn="ctr"/>
+            <a:r>
+              <a:rPr lang="ru-RU" sz="1050" dirty="0">
+                <a:ln w="0"/>
+                <a:solidFill>
+                  <a:schemeClr val="tx1"/>
+                </a:solidFill>
+                <a:effectLst>
+                  <a:outerShdw blurRad="38100" dist="19050" dir="2700000" algn="tl" rotWithShape="0">
+                    <a:schemeClr val="dk1">
+                      <a:alpha val="40000"/>
+                    </a:schemeClr>
+                  </a:outerShdw>
+                </a:effectLst>
+              </a:rPr>
+              <a:t>Никнейм</a:t>
+            </a:r>
+            <a:endParaRPr lang="uk-UA" sz="1050" dirty="0"/>
+          </a:p>
+        </p:txBody>
+      </p:sp>
+      <p:sp>
+        <p:nvSpPr>
+          <p:cNvPr id="18" name="Прямоугольник 17">
+            <a:extLst>
+              <a:ext uri="{FF2B5EF4-FFF2-40B4-BE49-F238E27FC236}">
+                <a16:creationId xmlns:a16="http://schemas.microsoft.com/office/drawing/2014/main" id="{87A04025-C2C1-4FD2-91B1-3A29E84544B5}"/>
+              </a:ext>
+            </a:extLst>
+          </p:cNvPr>
+          <p:cNvSpPr/>
+          <p:nvPr/>
+        </p:nvSpPr>
+        <p:spPr>
+          <a:xfrm>
+            <a:off x="2344241" y="735218"/>
+            <a:ext cx="1084729" cy="320386"/>
+          </a:xfrm>
+          <a:prstGeom prst="rect">
+            <a:avLst/>
+          </a:prstGeom>
+          <a:solidFill>
+            <a:schemeClr val="accent6">
+              <a:lumMod val="40000"/>
+              <a:lumOff val="60000"/>
+            </a:schemeClr>
+          </a:solidFill>
+        </p:spPr>
+        <p:style>
+          <a:lnRef idx="2">
+            <a:schemeClr val="accent1">
+              <a:shade val="50000"/>
+            </a:schemeClr>
+          </a:lnRef>
+          <a:fillRef idx="1">
+            <a:schemeClr val="accent1"/>
+          </a:fillRef>
+          <a:effectRef idx="0">
+            <a:schemeClr val="accent1"/>
+          </a:effectRef>
+          <a:fontRef idx="minor">
+            <a:schemeClr val="lt1"/>
+          </a:fontRef>
+        </p:style>
+        <p:txBody>
+          <a:bodyPr rtlCol="0" anchor="ctr"/>
+          <a:lstStyle/>
+          <a:p>
+            <a:pPr algn="ctr"/>
+            <a:r>
+              <a:rPr lang="ru-RU" sz="1050" dirty="0">
+                <a:ln w="0"/>
+                <a:solidFill>
+                  <a:schemeClr val="tx1"/>
+                </a:solidFill>
+                <a:effectLst>
+                  <a:outerShdw blurRad="38100" dist="19050" dir="2700000" algn="tl" rotWithShape="0">
+                    <a:schemeClr val="dk1">
+                      <a:alpha val="40000"/>
+                    </a:schemeClr>
+                  </a:outerShdw>
+                </a:effectLst>
+              </a:rPr>
+              <a:t>ФИО</a:t>
+            </a:r>
+            <a:endParaRPr lang="uk-UA" sz="1050" dirty="0"/>
+          </a:p>
+        </p:txBody>
+      </p:sp>
+      <p:sp>
+        <p:nvSpPr>
+          <p:cNvPr id="19" name="Прямоугольник 18">
+            <a:extLst>
+              <a:ext uri="{FF2B5EF4-FFF2-40B4-BE49-F238E27FC236}">
+                <a16:creationId xmlns:a16="http://schemas.microsoft.com/office/drawing/2014/main" id="{777772E6-DA66-4BB8-B99C-09DAF99436D0}"/>
+              </a:ext>
+            </a:extLst>
+          </p:cNvPr>
+          <p:cNvSpPr/>
+          <p:nvPr/>
+        </p:nvSpPr>
+        <p:spPr>
+          <a:xfrm>
+            <a:off x="3570149" y="735218"/>
+            <a:ext cx="1084729" cy="320386"/>
+          </a:xfrm>
+          <a:prstGeom prst="rect">
+            <a:avLst/>
+          </a:prstGeom>
+          <a:solidFill>
+            <a:schemeClr val="accent6">
+              <a:lumMod val="40000"/>
+              <a:lumOff val="60000"/>
+            </a:schemeClr>
+          </a:solidFill>
+        </p:spPr>
+        <p:style>
+          <a:lnRef idx="2">
+            <a:schemeClr val="accent1">
+              <a:shade val="50000"/>
+            </a:schemeClr>
+          </a:lnRef>
+          <a:fillRef idx="1">
+            <a:schemeClr val="accent1"/>
+          </a:fillRef>
+          <a:effectRef idx="0">
+            <a:schemeClr val="accent1"/>
+          </a:effectRef>
+          <a:fontRef idx="minor">
+            <a:schemeClr val="lt1"/>
+          </a:fontRef>
+        </p:style>
+        <p:txBody>
+          <a:bodyPr rtlCol="0" anchor="ctr"/>
+          <a:lstStyle/>
+          <a:p>
+            <a:pPr algn="ctr"/>
+            <a:r>
+              <a:rPr lang="ru-RU" sz="1050" dirty="0">
+                <a:ln w="0"/>
+                <a:solidFill>
+                  <a:schemeClr val="tx1"/>
+                </a:solidFill>
+                <a:effectLst>
+                  <a:outerShdw blurRad="38100" dist="19050" dir="2700000" algn="tl" rotWithShape="0">
+                    <a:schemeClr val="dk1">
+                      <a:alpha val="40000"/>
+                    </a:schemeClr>
+                  </a:outerShdw>
+                </a:effectLst>
+              </a:rPr>
+              <a:t>почта</a:t>
+            </a:r>
+            <a:endParaRPr lang="uk-UA" sz="1050" dirty="0"/>
+          </a:p>
+        </p:txBody>
+      </p:sp>
+      <p:sp>
+        <p:nvSpPr>
+          <p:cNvPr id="20" name="Прямоугольник 19">
+            <a:extLst>
+              <a:ext uri="{FF2B5EF4-FFF2-40B4-BE49-F238E27FC236}">
+                <a16:creationId xmlns:a16="http://schemas.microsoft.com/office/drawing/2014/main" id="{C632F961-0000-43AB-BA92-202589BB578F}"/>
+              </a:ext>
+            </a:extLst>
+          </p:cNvPr>
+          <p:cNvSpPr/>
+          <p:nvPr/>
+        </p:nvSpPr>
+        <p:spPr>
+          <a:xfrm>
+            <a:off x="4796057" y="735218"/>
+            <a:ext cx="1685425" cy="320386"/>
+          </a:xfrm>
+          <a:prstGeom prst="rect">
+            <a:avLst/>
+          </a:prstGeom>
+          <a:solidFill>
+            <a:schemeClr val="accent6">
+              <a:lumMod val="40000"/>
+              <a:lumOff val="60000"/>
+            </a:schemeClr>
+          </a:solidFill>
+        </p:spPr>
+        <p:style>
+          <a:lnRef idx="2">
+            <a:schemeClr val="accent1">
+              <a:shade val="50000"/>
+            </a:schemeClr>
+          </a:lnRef>
+          <a:fillRef idx="1">
+            <a:schemeClr val="accent1"/>
+          </a:fillRef>
+          <a:effectRef idx="0">
+            <a:schemeClr val="accent1"/>
+          </a:effectRef>
+          <a:fontRef idx="minor">
+            <a:schemeClr val="lt1"/>
+          </a:fontRef>
+        </p:style>
+        <p:txBody>
+          <a:bodyPr rtlCol="0" anchor="ctr"/>
+          <a:lstStyle/>
+          <a:p>
+            <a:pPr algn="ctr"/>
+            <a:r>
+              <a:rPr lang="ru-RU" sz="1050" dirty="0">
+                <a:ln w="0"/>
+                <a:solidFill>
+                  <a:schemeClr val="tx1"/>
+                </a:solidFill>
+                <a:effectLst>
+                  <a:outerShdw blurRad="38100" dist="19050" dir="2700000" algn="tl" rotWithShape="0">
+                    <a:schemeClr val="dk1">
+                      <a:alpha val="40000"/>
+                    </a:schemeClr>
+                  </a:outerShdw>
+                </a:effectLst>
+              </a:rPr>
+              <a:t>Зашифрованный пароль</a:t>
+            </a:r>
+            <a:endParaRPr lang="uk-UA" sz="1050" dirty="0"/>
+          </a:p>
+        </p:txBody>
+      </p:sp>
+      <p:sp>
+        <p:nvSpPr>
+          <p:cNvPr id="24" name="Прямоугольник 23">
+            <a:extLst>
+              <a:ext uri="{FF2B5EF4-FFF2-40B4-BE49-F238E27FC236}">
+                <a16:creationId xmlns:a16="http://schemas.microsoft.com/office/drawing/2014/main" id="{1F21AE10-E751-46C9-8ABC-A28139DAF412}"/>
+              </a:ext>
+            </a:extLst>
+          </p:cNvPr>
+          <p:cNvSpPr/>
+          <p:nvPr/>
+        </p:nvSpPr>
+        <p:spPr>
+          <a:xfrm>
+            <a:off x="4796057" y="1840537"/>
+            <a:ext cx="1084729" cy="320386"/>
+          </a:xfrm>
+          <a:prstGeom prst="rect">
+            <a:avLst/>
+          </a:prstGeom>
+          <a:solidFill>
+            <a:schemeClr val="accent6">
+              <a:lumMod val="40000"/>
+              <a:lumOff val="60000"/>
+            </a:schemeClr>
+          </a:solidFill>
+        </p:spPr>
+        <p:style>
+          <a:lnRef idx="2">
+            <a:schemeClr val="accent1">
+              <a:shade val="50000"/>
+            </a:schemeClr>
+          </a:lnRef>
+          <a:fillRef idx="1">
+            <a:schemeClr val="accent1"/>
+          </a:fillRef>
+          <a:effectRef idx="0">
+            <a:schemeClr val="accent1"/>
+          </a:effectRef>
+          <a:fontRef idx="minor">
+            <a:schemeClr val="lt1"/>
+          </a:fontRef>
+        </p:style>
+        <p:txBody>
+          <a:bodyPr rtlCol="0" anchor="ctr"/>
+          <a:lstStyle/>
+          <a:p>
+            <a:pPr algn="ctr"/>
+            <a:r>
+              <a:rPr lang="ru-RU" sz="1050" dirty="0">
+                <a:ln w="0"/>
+                <a:solidFill>
+                  <a:schemeClr val="tx1"/>
+                </a:solidFill>
+                <a:effectLst>
+                  <a:outerShdw blurRad="38100" dist="19050" dir="2700000" algn="tl" rotWithShape="0">
+                    <a:schemeClr val="dk1">
+                      <a:alpha val="40000"/>
+                    </a:schemeClr>
+                  </a:outerShdw>
+                </a:effectLst>
+              </a:rPr>
+              <a:t>статус</a:t>
+            </a:r>
+            <a:endParaRPr lang="uk-UA" sz="1050" dirty="0"/>
+          </a:p>
+        </p:txBody>
+      </p:sp>
+      <p:sp>
+        <p:nvSpPr>
+          <p:cNvPr id="25" name="Прямоугольник 24">
+            <a:extLst>
+              <a:ext uri="{FF2B5EF4-FFF2-40B4-BE49-F238E27FC236}">
+                <a16:creationId xmlns:a16="http://schemas.microsoft.com/office/drawing/2014/main" id="{6AB13AA5-F02E-46C9-8472-26CA5DD53215}"/>
+              </a:ext>
+            </a:extLst>
+          </p:cNvPr>
+          <p:cNvSpPr/>
+          <p:nvPr/>
+        </p:nvSpPr>
+        <p:spPr>
+          <a:xfrm>
+            <a:off x="941294" y="2474259"/>
+            <a:ext cx="10721787" cy="824754"/>
+          </a:xfrm>
+          <a:prstGeom prst="rect">
+            <a:avLst/>
+          </a:prstGeom>
+        </p:spPr>
+        <p:style>
+          <a:lnRef idx="2">
+            <a:schemeClr val="accent1">
+              <a:shade val="50000"/>
+            </a:schemeClr>
+          </a:lnRef>
+          <a:fillRef idx="1">
+            <a:schemeClr val="accent1"/>
+          </a:fillRef>
+          <a:effectRef idx="0">
+            <a:schemeClr val="accent1"/>
+          </a:effectRef>
+          <a:fontRef idx="minor">
+            <a:schemeClr val="lt1"/>
+          </a:fontRef>
+        </p:style>
+        <p:txBody>
+          <a:bodyPr rtlCol="0" anchor="t"/>
+          <a:lstStyle/>
+          <a:p>
+            <a:pPr algn="ctr"/>
+            <a:r>
+              <a:rPr lang="ru-RU" dirty="0"/>
+              <a:t>База данных компаний</a:t>
+            </a:r>
+          </a:p>
+        </p:txBody>
+      </p:sp>
+      <p:sp>
+        <p:nvSpPr>
+          <p:cNvPr id="26" name="Прямоугольник 25">
+            <a:extLst>
+              <a:ext uri="{FF2B5EF4-FFF2-40B4-BE49-F238E27FC236}">
+                <a16:creationId xmlns:a16="http://schemas.microsoft.com/office/drawing/2014/main" id="{9F395AF6-4F4E-4378-A830-3908664308E6}"/>
+              </a:ext>
+            </a:extLst>
+          </p:cNvPr>
+          <p:cNvSpPr/>
+          <p:nvPr/>
+        </p:nvSpPr>
+        <p:spPr>
+          <a:xfrm>
+            <a:off x="1118333" y="2871479"/>
+            <a:ext cx="1084729" cy="320386"/>
+          </a:xfrm>
+          <a:prstGeom prst="rect">
+            <a:avLst/>
+          </a:prstGeom>
+          <a:solidFill>
+            <a:schemeClr val="accent6">
+              <a:lumMod val="40000"/>
+              <a:lumOff val="60000"/>
+            </a:schemeClr>
+          </a:solidFill>
+        </p:spPr>
+        <p:style>
+          <a:lnRef idx="2">
+            <a:schemeClr val="accent1">
+              <a:shade val="50000"/>
+            </a:schemeClr>
+          </a:lnRef>
+          <a:fillRef idx="1">
+            <a:schemeClr val="accent1"/>
+          </a:fillRef>
+          <a:effectRef idx="0">
+            <a:schemeClr val="accent1"/>
+          </a:effectRef>
+          <a:fontRef idx="minor">
+            <a:schemeClr val="lt1"/>
+          </a:fontRef>
+        </p:style>
+        <p:txBody>
+          <a:bodyPr rtlCol="0" anchor="ctr"/>
+          <a:lstStyle/>
+          <a:p>
+            <a:pPr algn="ctr"/>
+            <a:r>
+              <a:rPr lang="ru-RU" sz="1050" dirty="0">
+                <a:ln w="0"/>
+                <a:solidFill>
+                  <a:schemeClr val="tx1"/>
+                </a:solidFill>
+                <a:effectLst>
+                  <a:outerShdw blurRad="38100" dist="19050" dir="2700000" algn="tl" rotWithShape="0">
+                    <a:schemeClr val="dk1">
+                      <a:alpha val="40000"/>
+                    </a:schemeClr>
+                  </a:outerShdw>
+                </a:effectLst>
+              </a:rPr>
+              <a:t>Название</a:t>
+            </a:r>
+            <a:endParaRPr lang="uk-UA" sz="1050" dirty="0"/>
+          </a:p>
+        </p:txBody>
+      </p:sp>
+      <p:sp>
+        <p:nvSpPr>
+          <p:cNvPr id="27" name="Прямоугольник 26">
+            <a:extLst>
+              <a:ext uri="{FF2B5EF4-FFF2-40B4-BE49-F238E27FC236}">
+                <a16:creationId xmlns:a16="http://schemas.microsoft.com/office/drawing/2014/main" id="{5897B444-834E-49F8-9E2A-0FF487CF7E51}"/>
+              </a:ext>
+            </a:extLst>
+          </p:cNvPr>
+          <p:cNvSpPr/>
+          <p:nvPr/>
+        </p:nvSpPr>
+        <p:spPr>
+          <a:xfrm>
+            <a:off x="2344241" y="2871479"/>
+            <a:ext cx="1084729" cy="320386"/>
+          </a:xfrm>
+          <a:prstGeom prst="rect">
+            <a:avLst/>
+          </a:prstGeom>
+          <a:solidFill>
+            <a:schemeClr val="accent6">
+              <a:lumMod val="40000"/>
+              <a:lumOff val="60000"/>
+            </a:schemeClr>
+          </a:solidFill>
+        </p:spPr>
+        <p:style>
+          <a:lnRef idx="2">
+            <a:schemeClr val="accent1">
+              <a:shade val="50000"/>
+            </a:schemeClr>
+          </a:lnRef>
+          <a:fillRef idx="1">
+            <a:schemeClr val="accent1"/>
+          </a:fillRef>
+          <a:effectRef idx="0">
+            <a:schemeClr val="accent1"/>
+          </a:effectRef>
+          <a:fontRef idx="minor">
+            <a:schemeClr val="lt1"/>
+          </a:fontRef>
+        </p:style>
+        <p:txBody>
+          <a:bodyPr rtlCol="0" anchor="ctr"/>
+          <a:lstStyle/>
+          <a:p>
+            <a:pPr algn="ctr"/>
+            <a:r>
+              <a:rPr lang="ru-RU" sz="1050" dirty="0">
+                <a:ln w="0"/>
+                <a:solidFill>
+                  <a:schemeClr val="tx1"/>
+                </a:solidFill>
+                <a:effectLst>
+                  <a:outerShdw blurRad="38100" dist="19050" dir="2700000" algn="tl" rotWithShape="0">
+                    <a:schemeClr val="dk1">
+                      <a:alpha val="40000"/>
+                    </a:schemeClr>
+                  </a:outerShdw>
+                </a:effectLst>
+              </a:rPr>
+              <a:t>направление</a:t>
+            </a:r>
+            <a:endParaRPr lang="uk-UA" sz="1050" dirty="0"/>
+          </a:p>
+        </p:txBody>
+      </p:sp>
+      <p:sp>
+        <p:nvSpPr>
+          <p:cNvPr id="28" name="Прямоугольник 27">
+            <a:extLst>
+              <a:ext uri="{FF2B5EF4-FFF2-40B4-BE49-F238E27FC236}">
+                <a16:creationId xmlns:a16="http://schemas.microsoft.com/office/drawing/2014/main" id="{37094F26-6767-405B-BFCE-9EBEC64FDF05}"/>
+              </a:ext>
+            </a:extLst>
+          </p:cNvPr>
+          <p:cNvSpPr/>
+          <p:nvPr/>
+        </p:nvSpPr>
+        <p:spPr>
+          <a:xfrm>
+            <a:off x="3570149" y="2871479"/>
+            <a:ext cx="1084729" cy="320386"/>
+          </a:xfrm>
+          <a:prstGeom prst="rect">
+            <a:avLst/>
+          </a:prstGeom>
+          <a:solidFill>
+            <a:schemeClr val="accent6">
+              <a:lumMod val="40000"/>
+              <a:lumOff val="60000"/>
+            </a:schemeClr>
+          </a:solidFill>
+        </p:spPr>
+        <p:style>
+          <a:lnRef idx="2">
+            <a:schemeClr val="accent1">
+              <a:shade val="50000"/>
+            </a:schemeClr>
+          </a:lnRef>
+          <a:fillRef idx="1">
+            <a:schemeClr val="accent1"/>
+          </a:fillRef>
+          <a:effectRef idx="0">
+            <a:schemeClr val="accent1"/>
+          </a:effectRef>
+          <a:fontRef idx="minor">
+            <a:schemeClr val="lt1"/>
+          </a:fontRef>
+        </p:style>
+        <p:txBody>
+          <a:bodyPr rtlCol="0" anchor="ctr"/>
+          <a:lstStyle/>
+          <a:p>
+            <a:pPr algn="ctr"/>
+            <a:r>
+              <a:rPr lang="ru-RU" sz="1050" dirty="0">
+                <a:ln w="0"/>
+                <a:solidFill>
+                  <a:schemeClr val="tx1"/>
+                </a:solidFill>
+                <a:effectLst>
+                  <a:outerShdw blurRad="38100" dist="19050" dir="2700000" algn="tl" rotWithShape="0">
+                    <a:schemeClr val="dk1">
+                      <a:alpha val="40000"/>
+                    </a:schemeClr>
+                  </a:outerShdw>
+                </a:effectLst>
+              </a:rPr>
+              <a:t>сайт</a:t>
+            </a:r>
+            <a:endParaRPr lang="uk-UA" sz="1050" dirty="0"/>
+          </a:p>
+        </p:txBody>
+      </p:sp>
+      <p:sp>
+        <p:nvSpPr>
+          <p:cNvPr id="29" name="Прямоугольник 28">
+            <a:extLst>
+              <a:ext uri="{FF2B5EF4-FFF2-40B4-BE49-F238E27FC236}">
+                <a16:creationId xmlns:a16="http://schemas.microsoft.com/office/drawing/2014/main" id="{4BAB3CDA-2E54-4867-93B0-C940DDAD4FDC}"/>
+              </a:ext>
+            </a:extLst>
+          </p:cNvPr>
+          <p:cNvSpPr/>
+          <p:nvPr/>
+        </p:nvSpPr>
+        <p:spPr>
+          <a:xfrm>
+            <a:off x="6002968" y="2886636"/>
+            <a:ext cx="1084729" cy="320386"/>
+          </a:xfrm>
+          <a:prstGeom prst="rect">
+            <a:avLst/>
+          </a:prstGeom>
+          <a:solidFill>
+            <a:schemeClr val="bg1">
+              <a:lumMod val="95000"/>
+            </a:schemeClr>
+          </a:solidFill>
+        </p:spPr>
+        <p:style>
+          <a:lnRef idx="2">
+            <a:schemeClr val="accent1">
+              <a:shade val="50000"/>
+            </a:schemeClr>
+          </a:lnRef>
+          <a:fillRef idx="1">
+            <a:schemeClr val="accent1"/>
+          </a:fillRef>
+          <a:effectRef idx="0">
+            <a:schemeClr val="accent1"/>
+          </a:effectRef>
+          <a:fontRef idx="minor">
+            <a:schemeClr val="lt1"/>
+          </a:fontRef>
+        </p:style>
+        <p:txBody>
+          <a:bodyPr rtlCol="0" anchor="ctr"/>
+          <a:lstStyle/>
+          <a:p>
+            <a:pPr algn="ctr"/>
+            <a:endParaRPr lang="uk-UA" sz="1050" dirty="0"/>
+          </a:p>
+        </p:txBody>
+      </p:sp>
+      <p:sp>
+        <p:nvSpPr>
+          <p:cNvPr id="30" name="Прямоугольник 29">
+            <a:extLst>
+              <a:ext uri="{FF2B5EF4-FFF2-40B4-BE49-F238E27FC236}">
+                <a16:creationId xmlns:a16="http://schemas.microsoft.com/office/drawing/2014/main" id="{9A0496D9-EAAA-4E8B-8739-EF957B55F0C8}"/>
+              </a:ext>
+            </a:extLst>
+          </p:cNvPr>
+          <p:cNvSpPr/>
+          <p:nvPr/>
+        </p:nvSpPr>
+        <p:spPr>
+          <a:xfrm>
+            <a:off x="7209879" y="2886636"/>
+            <a:ext cx="1084729" cy="320386"/>
+          </a:xfrm>
+          <a:prstGeom prst="rect">
+            <a:avLst/>
+          </a:prstGeom>
+          <a:solidFill>
+            <a:schemeClr val="bg1">
+              <a:lumMod val="95000"/>
+            </a:schemeClr>
+          </a:solidFill>
+        </p:spPr>
+        <p:style>
+          <a:lnRef idx="2">
+            <a:schemeClr val="accent1">
+              <a:shade val="50000"/>
+            </a:schemeClr>
+          </a:lnRef>
+          <a:fillRef idx="1">
+            <a:schemeClr val="accent1"/>
+          </a:fillRef>
+          <a:effectRef idx="0">
+            <a:schemeClr val="accent1"/>
+          </a:effectRef>
+          <a:fontRef idx="minor">
+            <a:schemeClr val="lt1"/>
+          </a:fontRef>
+        </p:style>
+        <p:txBody>
+          <a:bodyPr rtlCol="0" anchor="ctr"/>
+          <a:lstStyle/>
+          <a:p>
+            <a:pPr algn="ctr"/>
+            <a:endParaRPr lang="uk-UA" sz="1050" dirty="0"/>
+          </a:p>
+        </p:txBody>
+      </p:sp>
+      <p:sp>
+        <p:nvSpPr>
+          <p:cNvPr id="31" name="Прямоугольник 30">
+            <a:extLst>
+              <a:ext uri="{FF2B5EF4-FFF2-40B4-BE49-F238E27FC236}">
+                <a16:creationId xmlns:a16="http://schemas.microsoft.com/office/drawing/2014/main" id="{7875BC40-808B-41E6-92A1-5E801FD6A1F6}"/>
+              </a:ext>
+            </a:extLst>
+          </p:cNvPr>
+          <p:cNvSpPr/>
+          <p:nvPr/>
+        </p:nvSpPr>
+        <p:spPr>
+          <a:xfrm>
+            <a:off x="8435787" y="2886636"/>
+            <a:ext cx="2931459" cy="320386"/>
+          </a:xfrm>
+          <a:prstGeom prst="rect">
+            <a:avLst/>
+          </a:prstGeom>
+          <a:solidFill>
+            <a:schemeClr val="bg1">
+              <a:lumMod val="95000"/>
+            </a:schemeClr>
+          </a:solidFill>
+        </p:spPr>
+        <p:style>
+          <a:lnRef idx="2">
+            <a:schemeClr val="accent1">
+              <a:shade val="50000"/>
+            </a:schemeClr>
+          </a:lnRef>
+          <a:fillRef idx="1">
+            <a:schemeClr val="accent1"/>
+          </a:fillRef>
+          <a:effectRef idx="0">
+            <a:schemeClr val="accent1"/>
+          </a:effectRef>
+          <a:fontRef idx="minor">
+            <a:schemeClr val="lt1"/>
+          </a:fontRef>
+        </p:style>
+        <p:txBody>
+          <a:bodyPr rtlCol="0" anchor="ctr"/>
+          <a:lstStyle/>
+          <a:p>
+            <a:pPr algn="ctr"/>
+            <a:endParaRPr lang="uk-UA" sz="1050" dirty="0"/>
+          </a:p>
+        </p:txBody>
+      </p:sp>
+      <p:sp>
+        <p:nvSpPr>
+          <p:cNvPr id="32" name="Прямоугольник 31">
+            <a:extLst>
+              <a:ext uri="{FF2B5EF4-FFF2-40B4-BE49-F238E27FC236}">
+                <a16:creationId xmlns:a16="http://schemas.microsoft.com/office/drawing/2014/main" id="{FAA0BC7E-2771-4393-9D9A-349A29E774B6}"/>
+              </a:ext>
+            </a:extLst>
+          </p:cNvPr>
+          <p:cNvSpPr/>
+          <p:nvPr/>
+        </p:nvSpPr>
+        <p:spPr>
+          <a:xfrm>
+            <a:off x="4796057" y="2871479"/>
+            <a:ext cx="1084729" cy="320386"/>
+          </a:xfrm>
+          <a:prstGeom prst="rect">
+            <a:avLst/>
+          </a:prstGeom>
+          <a:solidFill>
+            <a:schemeClr val="accent6">
+              <a:lumMod val="40000"/>
+              <a:lumOff val="60000"/>
+            </a:schemeClr>
+          </a:solidFill>
+        </p:spPr>
+        <p:style>
+          <a:lnRef idx="2">
+            <a:schemeClr val="accent1">
+              <a:shade val="50000"/>
+            </a:schemeClr>
+          </a:lnRef>
+          <a:fillRef idx="1">
+            <a:schemeClr val="accent1"/>
+          </a:fillRef>
+          <a:effectRef idx="0">
+            <a:schemeClr val="accent1"/>
+          </a:effectRef>
+          <a:fontRef idx="minor">
+            <a:schemeClr val="lt1"/>
+          </a:fontRef>
+        </p:style>
+        <p:txBody>
+          <a:bodyPr rtlCol="0" anchor="ctr"/>
+          <a:lstStyle/>
+          <a:p>
+            <a:pPr algn="ctr"/>
+            <a:r>
+              <a:rPr lang="ru-RU" sz="1050" dirty="0">
+                <a:solidFill>
+                  <a:schemeClr val="tx1"/>
+                </a:solidFill>
+              </a:rPr>
+              <a:t>статус</a:t>
+            </a:r>
+            <a:endParaRPr lang="uk-UA" sz="1050" dirty="0">
+              <a:solidFill>
+                <a:schemeClr val="tx1"/>
+              </a:solidFill>
+            </a:endParaRPr>
+          </a:p>
+        </p:txBody>
+      </p:sp>
+      <p:sp>
+        <p:nvSpPr>
+          <p:cNvPr id="33" name="Прямоугольник 32">
+            <a:extLst>
+              <a:ext uri="{FF2B5EF4-FFF2-40B4-BE49-F238E27FC236}">
+                <a16:creationId xmlns:a16="http://schemas.microsoft.com/office/drawing/2014/main" id="{FFCE0F82-36CF-4D33-9850-FA8F76886B59}"/>
+              </a:ext>
+            </a:extLst>
+          </p:cNvPr>
+          <p:cNvSpPr/>
+          <p:nvPr/>
+        </p:nvSpPr>
+        <p:spPr>
+          <a:xfrm>
+            <a:off x="941294" y="3599350"/>
+            <a:ext cx="10721787" cy="824754"/>
+          </a:xfrm>
+          <a:prstGeom prst="rect">
+            <a:avLst/>
+          </a:prstGeom>
+        </p:spPr>
+        <p:style>
+          <a:lnRef idx="2">
+            <a:schemeClr val="accent1">
+              <a:shade val="50000"/>
+            </a:schemeClr>
+          </a:lnRef>
+          <a:fillRef idx="1">
+            <a:schemeClr val="accent1"/>
+          </a:fillRef>
+          <a:effectRef idx="0">
+            <a:schemeClr val="accent1"/>
+          </a:effectRef>
+          <a:fontRef idx="minor">
+            <a:schemeClr val="lt1"/>
+          </a:fontRef>
+        </p:style>
+        <p:txBody>
+          <a:bodyPr rtlCol="0" anchor="t"/>
+          <a:lstStyle/>
+          <a:p>
+            <a:pPr algn="ctr"/>
+            <a:r>
+              <a:rPr lang="ru-RU" dirty="0"/>
+              <a:t>База данных проектов</a:t>
+            </a:r>
+          </a:p>
+        </p:txBody>
+      </p:sp>
+      <p:sp>
+        <p:nvSpPr>
+          <p:cNvPr id="34" name="Прямоугольник 33">
+            <a:extLst>
+              <a:ext uri="{FF2B5EF4-FFF2-40B4-BE49-F238E27FC236}">
+                <a16:creationId xmlns:a16="http://schemas.microsoft.com/office/drawing/2014/main" id="{03133198-3B87-45B4-9CE9-33F2718FDF76}"/>
+              </a:ext>
+            </a:extLst>
+          </p:cNvPr>
+          <p:cNvSpPr/>
+          <p:nvPr/>
+        </p:nvSpPr>
+        <p:spPr>
+          <a:xfrm>
+            <a:off x="1118333" y="3996570"/>
+            <a:ext cx="1084729" cy="320386"/>
+          </a:xfrm>
+          <a:prstGeom prst="rect">
+            <a:avLst/>
+          </a:prstGeom>
+          <a:solidFill>
+            <a:schemeClr val="accent6">
+              <a:lumMod val="40000"/>
+              <a:lumOff val="60000"/>
+            </a:schemeClr>
+          </a:solidFill>
+        </p:spPr>
+        <p:style>
+          <a:lnRef idx="2">
+            <a:schemeClr val="accent1">
+              <a:shade val="50000"/>
+            </a:schemeClr>
+          </a:lnRef>
+          <a:fillRef idx="1">
+            <a:schemeClr val="accent1"/>
+          </a:fillRef>
+          <a:effectRef idx="0">
+            <a:schemeClr val="accent1"/>
+          </a:effectRef>
+          <a:fontRef idx="minor">
+            <a:schemeClr val="lt1"/>
+          </a:fontRef>
+        </p:style>
+        <p:txBody>
+          <a:bodyPr rtlCol="0" anchor="ctr"/>
+          <a:lstStyle/>
+          <a:p>
+            <a:pPr algn="ctr"/>
+            <a:r>
+              <a:rPr lang="ru-RU" sz="1050" dirty="0">
+                <a:ln w="0"/>
+                <a:solidFill>
+                  <a:schemeClr val="tx1"/>
+                </a:solidFill>
+                <a:effectLst>
+                  <a:outerShdw blurRad="38100" dist="19050" dir="2700000" algn="tl" rotWithShape="0">
+                    <a:schemeClr val="dk1">
+                      <a:alpha val="40000"/>
+                    </a:schemeClr>
+                  </a:outerShdw>
+                </a:effectLst>
+              </a:rPr>
+              <a:t>Название</a:t>
+            </a:r>
+            <a:endParaRPr lang="uk-UA" sz="1050" dirty="0"/>
+          </a:p>
+        </p:txBody>
+      </p:sp>
+      <p:sp>
+        <p:nvSpPr>
+          <p:cNvPr id="35" name="Прямоугольник 34">
+            <a:extLst>
+              <a:ext uri="{FF2B5EF4-FFF2-40B4-BE49-F238E27FC236}">
+                <a16:creationId xmlns:a16="http://schemas.microsoft.com/office/drawing/2014/main" id="{3966EEF0-9A5D-4E55-A381-7AD954785A5E}"/>
+              </a:ext>
+            </a:extLst>
+          </p:cNvPr>
+          <p:cNvSpPr/>
+          <p:nvPr/>
+        </p:nvSpPr>
+        <p:spPr>
+          <a:xfrm>
+            <a:off x="2344241" y="3996570"/>
+            <a:ext cx="1084729" cy="320386"/>
+          </a:xfrm>
+          <a:prstGeom prst="rect">
+            <a:avLst/>
+          </a:prstGeom>
+          <a:solidFill>
+            <a:schemeClr val="accent6">
+              <a:lumMod val="40000"/>
+              <a:lumOff val="60000"/>
+            </a:schemeClr>
+          </a:solidFill>
+        </p:spPr>
+        <p:style>
+          <a:lnRef idx="2">
+            <a:schemeClr val="accent1">
+              <a:shade val="50000"/>
+            </a:schemeClr>
+          </a:lnRef>
+          <a:fillRef idx="1">
+            <a:schemeClr val="accent1"/>
+          </a:fillRef>
+          <a:effectRef idx="0">
+            <a:schemeClr val="accent1"/>
+          </a:effectRef>
+          <a:fontRef idx="minor">
+            <a:schemeClr val="lt1"/>
+          </a:fontRef>
+        </p:style>
+        <p:txBody>
+          <a:bodyPr rtlCol="0" anchor="ctr"/>
+          <a:lstStyle/>
+          <a:p>
+            <a:pPr algn="ctr"/>
+            <a:r>
+              <a:rPr lang="ru-RU" sz="1050" dirty="0">
+                <a:ln w="0"/>
+                <a:solidFill>
+                  <a:schemeClr val="tx1"/>
+                </a:solidFill>
+                <a:effectLst>
+                  <a:outerShdw blurRad="38100" dist="19050" dir="2700000" algn="tl" rotWithShape="0">
+                    <a:schemeClr val="dk1">
+                      <a:alpha val="40000"/>
+                    </a:schemeClr>
+                  </a:outerShdw>
+                </a:effectLst>
+              </a:rPr>
+              <a:t>направление</a:t>
+            </a:r>
+            <a:endParaRPr lang="uk-UA" sz="1050" dirty="0"/>
+          </a:p>
+        </p:txBody>
+      </p:sp>
+      <p:sp>
+        <p:nvSpPr>
+          <p:cNvPr id="36" name="Прямоугольник 35">
+            <a:extLst>
+              <a:ext uri="{FF2B5EF4-FFF2-40B4-BE49-F238E27FC236}">
+                <a16:creationId xmlns:a16="http://schemas.microsoft.com/office/drawing/2014/main" id="{089EFAED-DF4A-4E07-8CF1-86BB9EBBE225}"/>
+              </a:ext>
+            </a:extLst>
+          </p:cNvPr>
+          <p:cNvSpPr/>
+          <p:nvPr/>
+        </p:nvSpPr>
+        <p:spPr>
+          <a:xfrm>
+            <a:off x="3570149" y="3996570"/>
+            <a:ext cx="1084729" cy="320386"/>
+          </a:xfrm>
+          <a:prstGeom prst="rect">
+            <a:avLst/>
+          </a:prstGeom>
+          <a:solidFill>
+            <a:schemeClr val="accent6">
+              <a:lumMod val="40000"/>
+              <a:lumOff val="60000"/>
+            </a:schemeClr>
+          </a:solidFill>
+        </p:spPr>
+        <p:style>
+          <a:lnRef idx="2">
+            <a:schemeClr val="accent1">
+              <a:shade val="50000"/>
+            </a:schemeClr>
+          </a:lnRef>
+          <a:fillRef idx="1">
+            <a:schemeClr val="accent1"/>
+          </a:fillRef>
+          <a:effectRef idx="0">
+            <a:schemeClr val="accent1"/>
+          </a:effectRef>
+          <a:fontRef idx="minor">
+            <a:schemeClr val="lt1"/>
+          </a:fontRef>
+        </p:style>
+        <p:txBody>
+          <a:bodyPr rtlCol="0" anchor="ctr"/>
+          <a:lstStyle/>
+          <a:p>
+            <a:pPr algn="ctr"/>
+            <a:r>
+              <a:rPr lang="ru-RU" sz="1050" dirty="0">
+                <a:ln w="0"/>
+                <a:solidFill>
+                  <a:schemeClr val="tx1"/>
+                </a:solidFill>
+                <a:effectLst>
+                  <a:outerShdw blurRad="38100" dist="19050" dir="2700000" algn="tl" rotWithShape="0">
+                    <a:schemeClr val="dk1">
+                      <a:alpha val="40000"/>
+                    </a:schemeClr>
+                  </a:outerShdw>
+                </a:effectLst>
+              </a:rPr>
+              <a:t>бюджет</a:t>
+            </a:r>
+            <a:endParaRPr lang="uk-UA" sz="1050" dirty="0"/>
+          </a:p>
+        </p:txBody>
+      </p:sp>
+      <p:sp>
+        <p:nvSpPr>
+          <p:cNvPr id="37" name="Прямоугольник 36">
+            <a:extLst>
+              <a:ext uri="{FF2B5EF4-FFF2-40B4-BE49-F238E27FC236}">
+                <a16:creationId xmlns:a16="http://schemas.microsoft.com/office/drawing/2014/main" id="{D5C26809-474E-416C-89E9-CDF401FF499F}"/>
+              </a:ext>
+            </a:extLst>
+          </p:cNvPr>
+          <p:cNvSpPr/>
+          <p:nvPr/>
+        </p:nvSpPr>
+        <p:spPr>
+          <a:xfrm>
+            <a:off x="6002968" y="4011727"/>
+            <a:ext cx="1084729" cy="320386"/>
+          </a:xfrm>
+          <a:prstGeom prst="rect">
+            <a:avLst/>
+          </a:prstGeom>
+          <a:solidFill>
+            <a:schemeClr val="bg1">
+              <a:lumMod val="95000"/>
+            </a:schemeClr>
+          </a:solidFill>
+        </p:spPr>
+        <p:style>
+          <a:lnRef idx="2">
+            <a:schemeClr val="accent1">
+              <a:shade val="50000"/>
+            </a:schemeClr>
+          </a:lnRef>
+          <a:fillRef idx="1">
+            <a:schemeClr val="accent1"/>
+          </a:fillRef>
+          <a:effectRef idx="0">
+            <a:schemeClr val="accent1"/>
+          </a:effectRef>
+          <a:fontRef idx="minor">
+            <a:schemeClr val="lt1"/>
+          </a:fontRef>
+        </p:style>
+        <p:txBody>
+          <a:bodyPr rtlCol="0" anchor="ctr"/>
+          <a:lstStyle/>
+          <a:p>
+            <a:pPr algn="ctr"/>
+            <a:endParaRPr lang="uk-UA" sz="1050" dirty="0"/>
+          </a:p>
+        </p:txBody>
+      </p:sp>
+      <p:sp>
+        <p:nvSpPr>
+          <p:cNvPr id="38" name="Прямоугольник 37">
+            <a:extLst>
+              <a:ext uri="{FF2B5EF4-FFF2-40B4-BE49-F238E27FC236}">
+                <a16:creationId xmlns:a16="http://schemas.microsoft.com/office/drawing/2014/main" id="{4D7913EF-4C5E-4192-B7E4-EC85D88EB7A6}"/>
+              </a:ext>
+            </a:extLst>
+          </p:cNvPr>
+          <p:cNvSpPr/>
+          <p:nvPr/>
+        </p:nvSpPr>
+        <p:spPr>
+          <a:xfrm>
+            <a:off x="7209879" y="4011727"/>
+            <a:ext cx="1084729" cy="320386"/>
+          </a:xfrm>
+          <a:prstGeom prst="rect">
+            <a:avLst/>
+          </a:prstGeom>
+          <a:solidFill>
+            <a:schemeClr val="bg1">
+              <a:lumMod val="95000"/>
+            </a:schemeClr>
+          </a:solidFill>
+        </p:spPr>
+        <p:style>
+          <a:lnRef idx="2">
+            <a:schemeClr val="accent1">
+              <a:shade val="50000"/>
+            </a:schemeClr>
+          </a:lnRef>
+          <a:fillRef idx="1">
+            <a:schemeClr val="accent1"/>
+          </a:fillRef>
+          <a:effectRef idx="0">
+            <a:schemeClr val="accent1"/>
+          </a:effectRef>
+          <a:fontRef idx="minor">
+            <a:schemeClr val="lt1"/>
+          </a:fontRef>
+        </p:style>
+        <p:txBody>
+          <a:bodyPr rtlCol="0" anchor="ctr"/>
+          <a:lstStyle/>
+          <a:p>
+            <a:pPr algn="ctr"/>
+            <a:endParaRPr lang="uk-UA" sz="1050" dirty="0"/>
+          </a:p>
+        </p:txBody>
+      </p:sp>
+      <p:sp>
+        <p:nvSpPr>
+          <p:cNvPr id="39" name="Прямоугольник 38">
+            <a:extLst>
+              <a:ext uri="{FF2B5EF4-FFF2-40B4-BE49-F238E27FC236}">
+                <a16:creationId xmlns:a16="http://schemas.microsoft.com/office/drawing/2014/main" id="{A79000B0-BC46-4292-A27D-FC1230B13586}"/>
+              </a:ext>
+            </a:extLst>
+          </p:cNvPr>
+          <p:cNvSpPr/>
+          <p:nvPr/>
+        </p:nvSpPr>
+        <p:spPr>
+          <a:xfrm>
+            <a:off x="8435787" y="4011727"/>
+            <a:ext cx="2931459" cy="320386"/>
+          </a:xfrm>
+          <a:prstGeom prst="rect">
+            <a:avLst/>
+          </a:prstGeom>
+          <a:solidFill>
+            <a:schemeClr val="bg1">
+              <a:lumMod val="95000"/>
+            </a:schemeClr>
+          </a:solidFill>
+        </p:spPr>
+        <p:style>
+          <a:lnRef idx="2">
+            <a:schemeClr val="accent1">
+              <a:shade val="50000"/>
+            </a:schemeClr>
+          </a:lnRef>
+          <a:fillRef idx="1">
+            <a:schemeClr val="accent1"/>
+          </a:fillRef>
+          <a:effectRef idx="0">
+            <a:schemeClr val="accent1"/>
+          </a:effectRef>
+          <a:fontRef idx="minor">
+            <a:schemeClr val="lt1"/>
+          </a:fontRef>
+        </p:style>
+        <p:txBody>
+          <a:bodyPr rtlCol="0" anchor="ctr"/>
+          <a:lstStyle/>
+          <a:p>
+            <a:pPr algn="ctr"/>
+            <a:endParaRPr lang="uk-UA" sz="1050" dirty="0"/>
+          </a:p>
+        </p:txBody>
+      </p:sp>
+      <p:sp>
+        <p:nvSpPr>
+          <p:cNvPr id="40" name="Прямоугольник 39">
+            <a:extLst>
+              <a:ext uri="{FF2B5EF4-FFF2-40B4-BE49-F238E27FC236}">
+                <a16:creationId xmlns:a16="http://schemas.microsoft.com/office/drawing/2014/main" id="{36F4E443-252B-4130-A844-0D59247E534D}"/>
+              </a:ext>
+            </a:extLst>
+          </p:cNvPr>
+          <p:cNvSpPr/>
+          <p:nvPr/>
+        </p:nvSpPr>
+        <p:spPr>
+          <a:xfrm>
+            <a:off x="4796057" y="3996570"/>
+            <a:ext cx="1084729" cy="320386"/>
+          </a:xfrm>
+          <a:prstGeom prst="rect">
+            <a:avLst/>
+          </a:prstGeom>
+          <a:solidFill>
+            <a:schemeClr val="accent6">
+              <a:lumMod val="40000"/>
+              <a:lumOff val="60000"/>
+            </a:schemeClr>
+          </a:solidFill>
+        </p:spPr>
+        <p:style>
+          <a:lnRef idx="2">
+            <a:schemeClr val="accent1">
+              <a:shade val="50000"/>
+            </a:schemeClr>
+          </a:lnRef>
+          <a:fillRef idx="1">
+            <a:schemeClr val="accent1"/>
+          </a:fillRef>
+          <a:effectRef idx="0">
+            <a:schemeClr val="accent1"/>
+          </a:effectRef>
+          <a:fontRef idx="minor">
+            <a:schemeClr val="lt1"/>
+          </a:fontRef>
+        </p:style>
+        <p:txBody>
+          <a:bodyPr rtlCol="0" anchor="ctr"/>
+          <a:lstStyle/>
+          <a:p>
+            <a:pPr algn="ctr"/>
+            <a:r>
+              <a:rPr lang="ru-RU" sz="1050" dirty="0">
+                <a:solidFill>
+                  <a:schemeClr val="tx1"/>
+                </a:solidFill>
+              </a:rPr>
+              <a:t>статус</a:t>
+            </a:r>
+            <a:endParaRPr lang="uk-UA" sz="1050" dirty="0">
+              <a:solidFill>
+                <a:schemeClr val="tx1"/>
+              </a:solidFill>
+            </a:endParaRPr>
+          </a:p>
+        </p:txBody>
+      </p:sp>
+    </p:spTree>
+    <p:extLst>
+      <p:ext uri="{BB962C8B-B14F-4D97-AF65-F5344CB8AC3E}">
+        <p14:creationId xmlns:p14="http://schemas.microsoft.com/office/powerpoint/2010/main" val="936130033"/>
+      </p:ext>
+    </p:extLst>
+  </p:cSld>
+  <p:clrMapOvr>
+    <a:masterClrMapping/>
+  </p:clrMapOvr>
+</p:sld>
+</file>
+
 <file path=ppt/theme/theme1.xml><?xml version="1.0" encoding="utf-8"?>
 <a:theme xmlns:a="http://schemas.openxmlformats.org/drawingml/2006/main" name="Тема Office">
   <a:themeElements>

</xml_diff>